<commit_message>
Powerpoint for 2019 TPAC breakout
</commit_message>
<xml_diff>
--- a/TPAC/W3C-Personalization-2019-TPAC.pptx
+++ b/TPAC/W3C-Personalization-2019-TPAC.pptx
@@ -519,6 +519,20 @@
           <a:p>
             <a:endParaRPr lang="en-US" dirty="0"/>
           </a:p>
+          <a:p>
+            <a:r>
+              <a:rPr lang="en-US" dirty="0"/>
+              <a:t>https://</a:t>
+            </a:r>
+            <a:r>
+              <a:rPr lang="en-US" dirty="0" err="1"/>
+              <a:t>github.com</a:t>
+            </a:r>
+            <a:r>
+              <a:rPr lang="en-US" dirty="0"/>
+              <a:t>/w3c/personalization-semantics/blob/master/TPAC/W3C-Personalization-2019-TPAC.pptx</a:t>
+            </a:r>
+          </a:p>
         </p:txBody>
       </p:sp>
       <p:sp>
@@ -901,14 +915,14 @@
           </a:ln>
           <a:extLst>
             <a:ext uri="{909E8E84-426E-40dd-AFC4-6F175D3DCCD1}">
-              <a14:hiddenFill xmlns="" xmlns:a14="http://schemas.microsoft.com/office/drawing/2010/main">
+              <a14:hiddenFill xmlns:a14="http://schemas.microsoft.com/office/drawing/2010/main" xmlns="">
                 <a:solidFill>
                   <a:srgbClr val="FFFFFF"/>
                 </a:solidFill>
               </a14:hiddenFill>
             </a:ext>
             <a:ext uri="{91240B29-F687-4f45-9708-019B960494DF}">
-              <a14:hiddenLine xmlns="" xmlns:a14="http://schemas.microsoft.com/office/drawing/2010/main" w="9525">
+              <a14:hiddenLine xmlns:a14="http://schemas.microsoft.com/office/drawing/2010/main" xmlns="" w="9525">
                 <a:solidFill>
                   <a:srgbClr val="000000"/>
                 </a:solidFill>
@@ -2543,14 +2557,14 @@
             </a:ln>
             <a:extLst>
               <a:ext uri="{909E8E84-426E-40dd-AFC4-6F175D3DCCD1}">
-                <a14:hiddenFill xmlns="" xmlns:a14="http://schemas.microsoft.com/office/drawing/2010/main">
+                <a14:hiddenFill xmlns:a14="http://schemas.microsoft.com/office/drawing/2010/main" xmlns="">
                   <a:solidFill>
                     <a:srgbClr val="FFFFFF"/>
                   </a:solidFill>
                 </a14:hiddenFill>
               </a:ext>
               <a:ext uri="{91240B29-F687-4f45-9708-019B960494DF}">
-                <a14:hiddenLine xmlns="" xmlns:a14="http://schemas.microsoft.com/office/drawing/2010/main" w="9525">
+                <a14:hiddenLine xmlns:a14="http://schemas.microsoft.com/office/drawing/2010/main" xmlns="" w="9525">
                   <a:solidFill>
                     <a:srgbClr val="000000"/>
                   </a:solidFill>
@@ -2646,14 +2660,14 @@
           </a:ln>
           <a:extLst>
             <a:ext uri="{909E8E84-426E-40dd-AFC4-6F175D3DCCD1}">
-              <a14:hiddenFill xmlns="" xmlns:a14="http://schemas.microsoft.com/office/drawing/2010/main">
+              <a14:hiddenFill xmlns:a14="http://schemas.microsoft.com/office/drawing/2010/main" xmlns="">
                 <a:solidFill>
                   <a:srgbClr val="FFFFFF"/>
                 </a:solidFill>
               </a14:hiddenFill>
             </a:ext>
             <a:ext uri="{91240B29-F687-4f45-9708-019B960494DF}">
-              <a14:hiddenLine xmlns="" xmlns:a14="http://schemas.microsoft.com/office/drawing/2010/main" w="9525">
+              <a14:hiddenLine xmlns:a14="http://schemas.microsoft.com/office/drawing/2010/main" xmlns="" w="9525">
                 <a:solidFill>
                   <a:srgbClr val="000000"/>
                 </a:solidFill>
@@ -2705,14 +2719,14 @@
           </a:ln>
           <a:extLst>
             <a:ext uri="{909E8E84-426E-40dd-AFC4-6F175D3DCCD1}">
-              <a14:hiddenFill xmlns="" xmlns:a14="http://schemas.microsoft.com/office/drawing/2010/main">
+              <a14:hiddenFill xmlns:a14="http://schemas.microsoft.com/office/drawing/2010/main" xmlns="">
                 <a:solidFill>
                   <a:srgbClr val="FFFFFF"/>
                 </a:solidFill>
               </a14:hiddenFill>
             </a:ext>
             <a:ext uri="{91240B29-F687-4f45-9708-019B960494DF}">
-              <a14:hiddenLine xmlns="" xmlns:a14="http://schemas.microsoft.com/office/drawing/2010/main" w="9525">
+              <a14:hiddenLine xmlns:a14="http://schemas.microsoft.com/office/drawing/2010/main" xmlns="" w="9525">
                 <a:solidFill>
                   <a:srgbClr val="000000"/>
                 </a:solidFill>

</xml_diff>